<commit_message>
Debugged + made some changes
</commit_message>
<xml_diff>
--- a/User Demography Prediction.pptx
+++ b/User Demography Prediction.pptx
@@ -4282,16 +4282,13 @@
           <a:p>
             <a:r>
               <a:rPr lang="en-SG" dirty="0" smtClean="0"/>
-              <a:t>The features are then used to train an instance of </a:t>
-            </a:r>
-            <a:r>
-              <a:rPr lang="en-SG" dirty="0" err="1" smtClean="0"/>
-              <a:t>AdaBoost</a:t>
+              <a:t>The features are then used to train an </a:t>
             </a:r>
             <a:r>
               <a:rPr lang="en-SG" dirty="0" smtClean="0"/>
-              <a:t> (Gradient Boosting)</a:t>
-            </a:r>
+              <a:t>SVM</a:t>
+            </a:r>
+            <a:endParaRPr lang="en-SG" dirty="0" smtClean="0"/>
           </a:p>
           <a:p>
             <a:endParaRPr lang="en-SG" dirty="0"/>

</xml_diff>